<commit_message>
Fix bugs as discovered by Shuya
1. The default size text says "16 x 16", where the default size is 30 x 30
- change the text in index.html

2. Click on the pick color sets drawing mode to 'black'
- change mode to 'personal"
</commit_message>
<xml_diff>
--- a/Etch-A-Sketch.pptx
+++ b/Etch-A-Sketch.pptx
@@ -3335,7 +3335,7 @@
         </p:nvSpPr>
         <p:spPr>
           <a:xfrm>
-            <a:off x="4789170" y="1120140"/>
+            <a:off x="4772977" y="1120140"/>
             <a:ext cx="2026920" cy="697230"/>
           </a:xfrm>
           <a:prstGeom prst="rect">
@@ -3365,7 +3365,7 @@
             <a:pPr algn="ctr"/>
             <a:r>
               <a:rPr lang="en-US" dirty="0" err="1"/>
-              <a:t>Index.js</a:t>
+              <a:t>index.js</a:t>
             </a:r>
             <a:endParaRPr lang="en-US" dirty="0"/>
           </a:p>
@@ -3385,7 +3385,7 @@
         </p:nvSpPr>
         <p:spPr>
           <a:xfrm>
-            <a:off x="4789170" y="2244090"/>
+            <a:off x="4772977" y="2244090"/>
             <a:ext cx="2026920" cy="697230"/>
           </a:xfrm>
           <a:prstGeom prst="rect">
@@ -3434,7 +3434,7 @@
         </p:nvSpPr>
         <p:spPr>
           <a:xfrm>
-            <a:off x="6404610" y="3710940"/>
+            <a:off x="4772977" y="3710940"/>
             <a:ext cx="2026920" cy="697230"/>
           </a:xfrm>
           <a:prstGeom prst="rect">
@@ -3483,7 +3483,7 @@
         </p:nvSpPr>
         <p:spPr>
           <a:xfrm>
-            <a:off x="6968490" y="4960620"/>
+            <a:off x="4772977" y="4960620"/>
             <a:ext cx="2026920" cy="697230"/>
           </a:xfrm>
           <a:prstGeom prst="rect">
@@ -3532,7 +3532,7 @@
         </p:nvSpPr>
         <p:spPr>
           <a:xfrm>
-            <a:off x="2865120" y="3710940"/>
+            <a:off x="1217295" y="3710940"/>
             <a:ext cx="2026920" cy="697230"/>
           </a:xfrm>
           <a:prstGeom prst="rect">
@@ -3585,8 +3585,8 @@
         </p:nvCxnSpPr>
         <p:spPr>
           <a:xfrm flipV="1">
-            <a:off x="3878580" y="2941320"/>
-            <a:ext cx="1924050" cy="769620"/>
+            <a:off x="2230755" y="2941320"/>
+            <a:ext cx="3555682" cy="769620"/>
           </a:xfrm>
           <a:prstGeom prst="straightConnector1">
             <a:avLst/>
@@ -3621,15 +3621,13 @@
           </p:cNvPr>
           <p:cNvCxnSpPr>
             <a:cxnSpLocks/>
-            <a:stCxn id="6" idx="0"/>
-            <a:endCxn id="5" idx="2"/>
           </p:cNvCxnSpPr>
           <p:nvPr/>
         </p:nvCxnSpPr>
         <p:spPr>
-          <a:xfrm flipH="1" flipV="1">
-            <a:off x="5802630" y="2941320"/>
-            <a:ext cx="1615440" cy="769620"/>
+          <a:xfrm flipV="1">
+            <a:off x="5786437" y="2941320"/>
+            <a:ext cx="0" cy="769620"/>
           </a:xfrm>
           <a:prstGeom prst="straightConnector1">
             <a:avLst/>
@@ -3664,15 +3662,13 @@
           </p:cNvPr>
           <p:cNvCxnSpPr>
             <a:cxnSpLocks/>
-            <a:stCxn id="7" idx="0"/>
-            <a:endCxn id="6" idx="2"/>
           </p:cNvCxnSpPr>
           <p:nvPr/>
         </p:nvCxnSpPr>
         <p:spPr>
-          <a:xfrm flipH="1" flipV="1">
-            <a:off x="7418070" y="4408170"/>
-            <a:ext cx="563880" cy="552450"/>
+          <a:xfrm flipV="1">
+            <a:off x="5786437" y="4408170"/>
+            <a:ext cx="0" cy="552450"/>
           </a:xfrm>
           <a:prstGeom prst="straightConnector1">
             <a:avLst/>
@@ -3707,15 +3703,156 @@
           </p:cNvPr>
           <p:cNvCxnSpPr>
             <a:cxnSpLocks/>
-            <a:stCxn id="5" idx="0"/>
-            <a:endCxn id="4" idx="2"/>
           </p:cNvCxnSpPr>
           <p:nvPr/>
         </p:nvCxnSpPr>
         <p:spPr>
           <a:xfrm flipV="1">
-            <a:off x="5802630" y="1817370"/>
+            <a:off x="5786437" y="1817370"/>
             <a:ext cx="0" cy="426720"/>
+          </a:xfrm>
+          <a:prstGeom prst="straightConnector1">
+            <a:avLst/>
+          </a:prstGeom>
+          <a:ln>
+            <a:tailEnd type="triangle"/>
+          </a:ln>
+        </p:spPr>
+        <p:style>
+          <a:lnRef idx="1">
+            <a:schemeClr val="accent1"/>
+          </a:lnRef>
+          <a:fillRef idx="0">
+            <a:schemeClr val="accent1"/>
+          </a:fillRef>
+          <a:effectRef idx="0">
+            <a:schemeClr val="accent1"/>
+          </a:effectRef>
+          <a:fontRef idx="minor">
+            <a:schemeClr val="tx1"/>
+          </a:fontRef>
+        </p:style>
+      </p:cxnSp>
+      <p:sp>
+        <p:nvSpPr>
+          <p:cNvPr id="21" name="Rectangle 20">
+            <a:extLst>
+              <a:ext uri="{FF2B5EF4-FFF2-40B4-BE49-F238E27FC236}">
+                <a16:creationId xmlns:a16="http://schemas.microsoft.com/office/drawing/2014/main" id="{4720BAEC-543C-5DEB-6D6C-A499438DCB8D}"/>
+              </a:ext>
+            </a:extLst>
+          </p:cNvPr>
+          <p:cNvSpPr/>
+          <p:nvPr/>
+        </p:nvSpPr>
+        <p:spPr>
+          <a:xfrm>
+            <a:off x="8538210" y="1120140"/>
+            <a:ext cx="2026920" cy="697230"/>
+          </a:xfrm>
+          <a:prstGeom prst="rect">
+            <a:avLst/>
+          </a:prstGeom>
+        </p:spPr>
+        <p:style>
+          <a:lnRef idx="2">
+            <a:schemeClr val="accent1">
+              <a:shade val="50000"/>
+            </a:schemeClr>
+          </a:lnRef>
+          <a:fillRef idx="1">
+            <a:schemeClr val="accent1"/>
+          </a:fillRef>
+          <a:effectRef idx="0">
+            <a:schemeClr val="accent1"/>
+          </a:effectRef>
+          <a:fontRef idx="minor">
+            <a:schemeClr val="lt1"/>
+          </a:fontRef>
+        </p:style>
+        <p:txBody>
+          <a:bodyPr rtlCol="0" anchor="ctr"/>
+          <a:lstStyle/>
+          <a:p>
+            <a:pPr algn="ctr"/>
+            <a:r>
+              <a:rPr lang="en-US" dirty="0" err="1"/>
+              <a:t>index.html</a:t>
+            </a:r>
+            <a:endParaRPr lang="en-US" dirty="0"/>
+          </a:p>
+        </p:txBody>
+      </p:sp>
+      <p:sp>
+        <p:nvSpPr>
+          <p:cNvPr id="22" name="Rectangle 21">
+            <a:extLst>
+              <a:ext uri="{FF2B5EF4-FFF2-40B4-BE49-F238E27FC236}">
+                <a16:creationId xmlns:a16="http://schemas.microsoft.com/office/drawing/2014/main" id="{71045242-F272-9545-3A73-59CF54BD2C9C}"/>
+              </a:ext>
+            </a:extLst>
+          </p:cNvPr>
+          <p:cNvSpPr/>
+          <p:nvPr/>
+        </p:nvSpPr>
+        <p:spPr>
+          <a:xfrm>
+            <a:off x="8538210" y="3710940"/>
+            <a:ext cx="2026920" cy="697230"/>
+          </a:xfrm>
+          <a:prstGeom prst="rect">
+            <a:avLst/>
+          </a:prstGeom>
+        </p:spPr>
+        <p:style>
+          <a:lnRef idx="2">
+            <a:schemeClr val="accent1">
+              <a:shade val="50000"/>
+            </a:schemeClr>
+          </a:lnRef>
+          <a:fillRef idx="1">
+            <a:schemeClr val="accent1"/>
+          </a:fillRef>
+          <a:effectRef idx="0">
+            <a:schemeClr val="accent1"/>
+          </a:effectRef>
+          <a:fontRef idx="minor">
+            <a:schemeClr val="lt1"/>
+          </a:fontRef>
+        </p:style>
+        <p:txBody>
+          <a:bodyPr rtlCol="0" anchor="ctr"/>
+          <a:lstStyle/>
+          <a:p>
+            <a:pPr algn="ctr"/>
+            <a:r>
+              <a:rPr lang="en-US" dirty="0" err="1"/>
+              <a:t>style.css</a:t>
+            </a:r>
+            <a:endParaRPr lang="en-US" dirty="0"/>
+          </a:p>
+        </p:txBody>
+      </p:sp>
+      <p:cxnSp>
+        <p:nvCxnSpPr>
+          <p:cNvPr id="23" name="Straight Arrow Connector 22">
+            <a:extLst>
+              <a:ext uri="{FF2B5EF4-FFF2-40B4-BE49-F238E27FC236}">
+                <a16:creationId xmlns:a16="http://schemas.microsoft.com/office/drawing/2014/main" id="{7DC33B85-3E26-9CC6-3776-8E6AF6BA4F75}"/>
+              </a:ext>
+            </a:extLst>
+          </p:cNvPr>
+          <p:cNvCxnSpPr>
+            <a:cxnSpLocks/>
+            <a:stCxn id="22" idx="0"/>
+            <a:endCxn id="5" idx="2"/>
+          </p:cNvCxnSpPr>
+          <p:nvPr/>
+        </p:nvCxnSpPr>
+        <p:spPr>
+          <a:xfrm flipH="1" flipV="1">
+            <a:off x="5786437" y="2941320"/>
+            <a:ext cx="3765233" cy="769620"/>
           </a:xfrm>
           <a:prstGeom prst="straightConnector1">
             <a:avLst/>

</xml_diff>